<commit_message>
better dseign code block
Signed-off-by: ryan hs <mr.ryansilalahi@gmail.com>
</commit_message>
<xml_diff>
--- a/presentation/Simulated-Annealing - Ryan HS.pptx
+++ b/presentation/Simulated-Annealing - Ryan HS.pptx
@@ -5883,35 +5883,7 @@
                 </a:uFill>
                 <a:latin typeface="Calibri"/>
               </a:rPr>
-              <a:t>- </a:t>
-            </a:r>
-            <a:r>
-              <a:rPr lang="x-none" altLang="en-US" sz="4000" strike="noStrike" spc="-1">
-                <a:solidFill>
-                  <a:srgbClr val="E74C3C"/>
-                </a:solidFill>
-                <a:uFill>
-                  <a:solidFill>
-                    <a:srgbClr val="FFFFFF"/>
-                  </a:solidFill>
-                </a:uFill>
-                <a:latin typeface="Calibri"/>
-              </a:rPr>
-              <a:t>S</a:t>
-            </a:r>
-            <a:r>
-              <a:rPr lang="x-none" altLang="en-US" sz="4000" strike="noStrike" spc="-1">
-                <a:solidFill>
-                  <a:srgbClr val="E74C3C"/>
-                </a:solidFill>
-                <a:uFill>
-                  <a:solidFill>
-                    <a:srgbClr val="FFFFFF"/>
-                  </a:solidFill>
-                </a:uFill>
-                <a:latin typeface="Calibri"/>
-              </a:rPr>
-              <a:t>implified</a:t>
+              <a:t>- Simplified</a:t>
             </a:r>
             <a:endParaRPr lang="x-none" altLang="en-US" sz="4000" strike="noStrike" spc="-1">
               <a:solidFill>
@@ -6103,13 +6075,16 @@
             <a:avLst/>
           </a:prstGeom>
           <a:solidFill>
-            <a:schemeClr val="bg1">
-              <a:lumMod val="95000"/>
-            </a:schemeClr>
+            <a:srgbClr val="3F3F3F"/>
           </a:solidFill>
           <a:ln>
             <a:noFill/>
           </a:ln>
+          <a:effectLst>
+            <a:innerShdw blurRad="114300">
+              <a:prstClr val="black"/>
+            </a:innerShdw>
+          </a:effectLst>
           <a:extLst>
             <a:ext uri="{909E8E84-426E-40DD-AFC4-6F175D3DCCD1}">
               <a14:hiddenFill xmlns:a14="http://schemas.microsoft.com/office/drawing/2010/main">
@@ -6150,16 +6125,26 @@
             <a:r>
               <a:rPr lang="x-none" sz="1200">
                 <a:solidFill>
-                  <a:srgbClr val="2980B9"/>
+                  <a:schemeClr val="bg1"/>
                 </a:solidFill>
                 <a:latin typeface="Noto Sans [monotype]" charset="0"/>
                 <a:ea typeface="Sans Serif" charset="0"/>
               </a:rPr>
-              <a:t>T = 1000 // celcius</a:t>
+              <a:t>T = 1000</a:t>
+            </a:r>
+            <a:r>
+              <a:rPr lang="x-none" sz="1200">
+                <a:solidFill>
+                  <a:srgbClr val="E3CEAB"/>
+                </a:solidFill>
+                <a:latin typeface="Noto Sans [monotype]" charset="0"/>
+                <a:ea typeface="Sans Serif" charset="0"/>
+              </a:rPr>
+              <a:t> // celcius</a:t>
             </a:r>
             <a:endParaRPr lang="x-none" sz="1200">
               <a:solidFill>
-                <a:srgbClr val="2980B9"/>
+                <a:srgbClr val="E3CEAB"/>
               </a:solidFill>
               <a:latin typeface="Noto Sans [monotype]" charset="0"/>
               <a:ea typeface="Sans Serif" charset="0"/>
@@ -6179,16 +6164,36 @@
             <a:r>
               <a:rPr lang="x-none" sz="1200">
                 <a:solidFill>
-                  <a:srgbClr val="2980B9"/>
+                  <a:schemeClr val="bg1"/>
                 </a:solidFill>
                 <a:latin typeface="Noto Sans [monotype]" charset="0"/>
                 <a:ea typeface="Sans Serif" charset="0"/>
               </a:rPr>
-              <a:t>tmp_solution = generate_solution()</a:t>
+              <a:t>tmp_solution = </a:t>
+            </a:r>
+            <a:r>
+              <a:rPr lang="x-none" sz="1200">
+                <a:solidFill>
+                  <a:srgbClr val="D5D583"/>
+                </a:solidFill>
+                <a:latin typeface="Noto Sans [monotype]" charset="0"/>
+                <a:ea typeface="Sans Serif" charset="0"/>
+              </a:rPr>
+              <a:t>generate_solution</a:t>
+            </a:r>
+            <a:r>
+              <a:rPr lang="x-none" sz="1200">
+                <a:solidFill>
+                  <a:schemeClr val="bg1"/>
+                </a:solidFill>
+                <a:latin typeface="Noto Sans [monotype]" charset="0"/>
+                <a:ea typeface="Sans Serif" charset="0"/>
+              </a:rPr>
+              <a:t>()</a:t>
             </a:r>
             <a:endParaRPr lang="x-none" sz="1200">
               <a:solidFill>
-                <a:srgbClr val="2980B9"/>
+                <a:schemeClr val="bg1"/>
               </a:solidFill>
               <a:latin typeface="Noto Sans [monotype]" charset="0"/>
               <a:ea typeface="Sans Serif" charset="0"/>
@@ -6208,16 +6213,36 @@
             <a:r>
               <a:rPr lang="x-none" sz="1200">
                 <a:solidFill>
-                  <a:srgbClr val="2980B9"/>
+                  <a:schemeClr val="bg1"/>
                 </a:solidFill>
                 <a:latin typeface="Noto Sans [monotype]" charset="0"/>
                 <a:ea typeface="Sans Serif" charset="0"/>
               </a:rPr>
-              <a:t>tmp_result = evaluate(tmp_solution)</a:t>
+              <a:t>tmp_result = </a:t>
+            </a:r>
+            <a:r>
+              <a:rPr lang="x-none" sz="1200">
+                <a:solidFill>
+                  <a:srgbClr val="D5D583"/>
+                </a:solidFill>
+                <a:latin typeface="Noto Sans [monotype]" charset="0"/>
+                <a:ea typeface="Sans Serif" charset="0"/>
+              </a:rPr>
+              <a:t>evaluate</a:t>
+            </a:r>
+            <a:r>
+              <a:rPr lang="x-none" sz="1200">
+                <a:solidFill>
+                  <a:schemeClr val="bg1"/>
+                </a:solidFill>
+                <a:latin typeface="Noto Sans [monotype]" charset="0"/>
+                <a:ea typeface="Sans Serif" charset="0"/>
+              </a:rPr>
+              <a:t>(tmp_solution)</a:t>
             </a:r>
             <a:endParaRPr lang="x-none" sz="1200">
               <a:solidFill>
-                <a:srgbClr val="2980B9"/>
+                <a:schemeClr val="bg1"/>
               </a:solidFill>
               <a:latin typeface="Noto Sans [monotype]" charset="0"/>
               <a:ea typeface="Sans Serif" charset="0"/>
@@ -6237,7 +6262,7 @@
             <a:r>
               <a:rPr lang="x-none" sz="1200">
                 <a:solidFill>
-                  <a:srgbClr val="2980B9"/>
+                  <a:srgbClr val="D5D583"/>
                 </a:solidFill>
                 <a:latin typeface="Noto Sans [monotype]" charset="0"/>
                 <a:ea typeface="Sans Serif" charset="0"/>
@@ -6246,7 +6271,7 @@
             </a:r>
             <a:endParaRPr lang="x-none" sz="1200">
               <a:solidFill>
-                <a:srgbClr val="2980B9"/>
+                <a:srgbClr val="D5D583"/>
               </a:solidFill>
               <a:latin typeface="Noto Sans [monotype]" charset="0"/>
               <a:ea typeface="Sans Serif" charset="0"/>
@@ -6266,16 +6291,36 @@
             <a:r>
               <a:rPr lang="x-none" sz="1200">
                 <a:solidFill>
-                  <a:srgbClr val="2980B9"/>
+                  <a:schemeClr val="bg1"/>
                 </a:solidFill>
                 <a:latin typeface="Noto Sans [monotype]" charset="0"/>
                 <a:ea typeface="Sans Serif" charset="0"/>
               </a:rPr>
-              <a:t>	new_solution = modif(tmp_solution)</a:t>
+              <a:t>	new_solution = </a:t>
+            </a:r>
+            <a:r>
+              <a:rPr lang="x-none" sz="1200">
+                <a:solidFill>
+                  <a:srgbClr val="D5D583"/>
+                </a:solidFill>
+                <a:latin typeface="Noto Sans [monotype]" charset="0"/>
+                <a:ea typeface="Sans Serif" charset="0"/>
+              </a:rPr>
+              <a:t>modif</a:t>
+            </a:r>
+            <a:r>
+              <a:rPr lang="x-none" sz="1200">
+                <a:solidFill>
+                  <a:schemeClr val="bg1"/>
+                </a:solidFill>
+                <a:latin typeface="Noto Sans [monotype]" charset="0"/>
+                <a:ea typeface="Sans Serif" charset="0"/>
+              </a:rPr>
+              <a:t>(tmp_solution)</a:t>
             </a:r>
             <a:endParaRPr lang="x-none" sz="1200">
               <a:solidFill>
-                <a:srgbClr val="2980B9"/>
+                <a:schemeClr val="bg1"/>
               </a:solidFill>
               <a:latin typeface="Noto Sans [monotype]" charset="0"/>
               <a:ea typeface="Sans Serif" charset="0"/>
@@ -6295,16 +6340,36 @@
             <a:r>
               <a:rPr lang="x-none" sz="1200">
                 <a:solidFill>
-                  <a:srgbClr val="2980B9"/>
+                  <a:schemeClr val="bg1"/>
                 </a:solidFill>
                 <a:latin typeface="Noto Sans [monotype]" charset="0"/>
                 <a:ea typeface="Sans Serif" charset="0"/>
               </a:rPr>
-              <a:t>	new_result = evaluate(new_solution)</a:t>
+              <a:t>	new_result = </a:t>
+            </a:r>
+            <a:r>
+              <a:rPr lang="x-none" sz="1200">
+                <a:solidFill>
+                  <a:srgbClr val="D5D583"/>
+                </a:solidFill>
+                <a:latin typeface="Noto Sans [monotype]" charset="0"/>
+                <a:ea typeface="Sans Serif" charset="0"/>
+              </a:rPr>
+              <a:t>evaluate</a:t>
+            </a:r>
+            <a:r>
+              <a:rPr lang="x-none" sz="1200">
+                <a:solidFill>
+                  <a:schemeClr val="bg1"/>
+                </a:solidFill>
+                <a:latin typeface="Noto Sans [monotype]" charset="0"/>
+                <a:ea typeface="Sans Serif" charset="0"/>
+              </a:rPr>
+              <a:t>(new_solution)</a:t>
             </a:r>
             <a:endParaRPr lang="x-none" sz="1200">
               <a:solidFill>
-                <a:srgbClr val="2980B9"/>
+                <a:schemeClr val="bg1"/>
               </a:solidFill>
               <a:latin typeface="Noto Sans [monotype]" charset="0"/>
               <a:ea typeface="Sans Serif" charset="0"/>
@@ -6323,7 +6388,7 @@
             </a:pPr>
             <a:endParaRPr lang="x-none" sz="1200">
               <a:solidFill>
-                <a:srgbClr val="2980B9"/>
+                <a:schemeClr val="bg1"/>
               </a:solidFill>
               <a:latin typeface="Noto Sans [monotype]" charset="0"/>
               <a:ea typeface="Sans Serif" charset="0"/>
@@ -6343,16 +6408,36 @@
             <a:r>
               <a:rPr lang="x-none" sz="1200">
                 <a:solidFill>
-                  <a:srgbClr val="2980B9"/>
+                  <a:schemeClr val="bg1"/>
                 </a:solidFill>
                 <a:latin typeface="Noto Sans [monotype]" charset="0"/>
                 <a:ea typeface="Sans Serif" charset="0"/>
               </a:rPr>
-              <a:t>	if(new_result &gt; tmp_result)</a:t>
+              <a:t>	</a:t>
+            </a:r>
+            <a:r>
+              <a:rPr lang="x-none" sz="1200">
+                <a:solidFill>
+                  <a:srgbClr val="D5D583"/>
+                </a:solidFill>
+                <a:latin typeface="Noto Sans [monotype]" charset="0"/>
+                <a:ea typeface="Sans Serif" charset="0"/>
+              </a:rPr>
+              <a:t>if </a:t>
+            </a:r>
+            <a:r>
+              <a:rPr lang="x-none" sz="1200">
+                <a:solidFill>
+                  <a:schemeClr val="bg1"/>
+                </a:solidFill>
+                <a:latin typeface="Noto Sans [monotype]" charset="0"/>
+                <a:ea typeface="Sans Serif" charset="0"/>
+              </a:rPr>
+              <a:t>(new_result &gt; tmp_result)</a:t>
             </a:r>
             <a:endParaRPr lang="x-none" sz="1200">
               <a:solidFill>
-                <a:srgbClr val="2980B9"/>
+                <a:schemeClr val="bg1"/>
               </a:solidFill>
               <a:latin typeface="Noto Sans [monotype]" charset="0"/>
               <a:ea typeface="Sans Serif" charset="0"/>
@@ -6372,7 +6457,7 @@
             <a:r>
               <a:rPr lang="x-none" sz="1200">
                 <a:solidFill>
-                  <a:srgbClr val="2980B9"/>
+                  <a:schemeClr val="bg1"/>
                 </a:solidFill>
                 <a:latin typeface="Noto Sans [monotype]" charset="0"/>
                 <a:ea typeface="Sans Serif" charset="0"/>
@@ -6381,7 +6466,7 @@
             </a:r>
             <a:endParaRPr lang="x-none" sz="1200">
               <a:solidFill>
-                <a:srgbClr val="2980B9"/>
+                <a:schemeClr val="bg1"/>
               </a:solidFill>
               <a:latin typeface="Noto Sans [monotype]" charset="0"/>
               <a:ea typeface="Sans Serif" charset="0"/>
@@ -6401,7 +6486,7 @@
             <a:r>
               <a:rPr lang="x-none" sz="1200">
                 <a:solidFill>
-                  <a:srgbClr val="2980B9"/>
+                  <a:schemeClr val="bg1"/>
                 </a:solidFill>
                 <a:latin typeface="Noto Sans [monotype]" charset="0"/>
                 <a:ea typeface="Sans Serif" charset="0"/>
@@ -6410,7 +6495,7 @@
             </a:r>
             <a:endParaRPr lang="x-none" sz="1200">
               <a:solidFill>
-                <a:srgbClr val="2980B9"/>
+                <a:schemeClr val="bg1"/>
               </a:solidFill>
               <a:latin typeface="Noto Sans [monotype]" charset="0"/>
               <a:ea typeface="Sans Serif" charset="0"/>
@@ -6430,16 +6515,26 @@
             <a:r>
               <a:rPr lang="x-none" sz="1200">
                 <a:solidFill>
-                  <a:srgbClr val="2980B9"/>
+                  <a:schemeClr val="bg1"/>
                 </a:solidFill>
                 <a:latin typeface="Noto Sans [monotype]" charset="0"/>
                 <a:ea typeface="Sans Serif" charset="0"/>
               </a:rPr>
-              <a:t>	else</a:t>
+              <a:t>	</a:t>
+            </a:r>
+            <a:r>
+              <a:rPr lang="x-none" sz="1200">
+                <a:solidFill>
+                  <a:srgbClr val="D5D583"/>
+                </a:solidFill>
+                <a:latin typeface="Noto Sans [monotype]" charset="0"/>
+                <a:ea typeface="Sans Serif" charset="0"/>
+              </a:rPr>
+              <a:t>else</a:t>
             </a:r>
             <a:endParaRPr lang="x-none" sz="1200">
               <a:solidFill>
-                <a:srgbClr val="2980B9"/>
+                <a:srgbClr val="D5D583"/>
               </a:solidFill>
               <a:latin typeface="Noto Sans [monotype]" charset="0"/>
               <a:ea typeface="Sans Serif" charset="0"/>
@@ -6459,7 +6554,7 @@
             <a:r>
               <a:rPr lang="x-none" sz="1200">
                 <a:solidFill>
-                  <a:srgbClr val="2980B9"/>
+                  <a:schemeClr val="bg1"/>
                 </a:solidFill>
                 <a:latin typeface="Noto Sans [monotype]" charset="0"/>
                 <a:ea typeface="Sans Serif" charset="0"/>
@@ -6468,7 +6563,7 @@
             </a:r>
             <a:endParaRPr lang="x-none" sz="1200">
               <a:solidFill>
-                <a:srgbClr val="2980B9"/>
+                <a:schemeClr val="bg1"/>
               </a:solidFill>
               <a:latin typeface="Noto Sans [monotype]" charset="0"/>
               <a:ea typeface="Sans Serif" charset="0"/>
@@ -6488,16 +6583,36 @@
             <a:r>
               <a:rPr lang="x-none" sz="1200">
                 <a:solidFill>
-                  <a:srgbClr val="2980B9"/>
+                  <a:schemeClr val="bg1"/>
                 </a:solidFill>
                 <a:latin typeface="Noto Sans [monotype]" charset="0"/>
                 <a:ea typeface="Sans Serif" charset="0"/>
               </a:rPr>
-              <a:t>		e = exponential(D/T)</a:t>
+              <a:t>		e = </a:t>
+            </a:r>
+            <a:r>
+              <a:rPr lang="x-none" sz="1200">
+                <a:solidFill>
+                  <a:srgbClr val="D5D583"/>
+                </a:solidFill>
+                <a:latin typeface="Noto Sans [monotype]" charset="0"/>
+                <a:ea typeface="Sans Serif" charset="0"/>
+              </a:rPr>
+              <a:t>exponential</a:t>
+            </a:r>
+            <a:r>
+              <a:rPr lang="x-none" sz="1200">
+                <a:solidFill>
+                  <a:schemeClr val="bg1"/>
+                </a:solidFill>
+                <a:latin typeface="Noto Sans [monotype]" charset="0"/>
+                <a:ea typeface="Sans Serif" charset="0"/>
+              </a:rPr>
+              <a:t>(-D/T)</a:t>
             </a:r>
             <a:endParaRPr lang="x-none" sz="1200">
               <a:solidFill>
-                <a:srgbClr val="2980B9"/>
+                <a:schemeClr val="bg1"/>
               </a:solidFill>
               <a:latin typeface="Noto Sans [monotype]" charset="0"/>
               <a:ea typeface="Sans Serif" charset="0"/>
@@ -6517,16 +6632,36 @@
             <a:r>
               <a:rPr lang="x-none" sz="1200">
                 <a:solidFill>
-                  <a:srgbClr val="2980B9"/>
+                  <a:schemeClr val="bg1"/>
                 </a:solidFill>
                 <a:latin typeface="Noto Sans [monotype]" charset="0"/>
                 <a:ea typeface="Sans Serif" charset="0"/>
               </a:rPr>
-              <a:t>		r = random()</a:t>
+              <a:t>		r = </a:t>
+            </a:r>
+            <a:r>
+              <a:rPr lang="x-none" sz="1200">
+                <a:solidFill>
+                  <a:srgbClr val="D5D583"/>
+                </a:solidFill>
+                <a:latin typeface="Noto Sans [monotype]" charset="0"/>
+                <a:ea typeface="Sans Serif" charset="0"/>
+              </a:rPr>
+              <a:t>random</a:t>
+            </a:r>
+            <a:r>
+              <a:rPr lang="x-none" sz="1200">
+                <a:solidFill>
+                  <a:schemeClr val="bg1"/>
+                </a:solidFill>
+                <a:latin typeface="Noto Sans [monotype]" charset="0"/>
+                <a:ea typeface="Sans Serif" charset="0"/>
+              </a:rPr>
+              <a:t>()</a:t>
             </a:r>
             <a:endParaRPr lang="x-none" sz="1200">
               <a:solidFill>
-                <a:srgbClr val="2980B9"/>
+                <a:schemeClr val="bg1"/>
               </a:solidFill>
               <a:latin typeface="Noto Sans [monotype]" charset="0"/>
               <a:ea typeface="Sans Serif" charset="0"/>
@@ -6546,17 +6681,37 @@
             <a:r>
               <a:rPr lang="x-none" sz="1200">
                 <a:solidFill>
-                  <a:srgbClr val="2980B9"/>
+                  <a:schemeClr val="bg1"/>
                 </a:solidFill>
                 <a:latin typeface="Noto Sans [monotype]" charset="0"/>
                 <a:ea typeface="Sans Serif" charset="0"/>
               </a:rPr>
-              <a:t>		if(e &gt; r)</a:t>
+              <a:t>		</a:t>
             </a:r>
             <a:r>
               <a:rPr lang="x-none" sz="1200">
                 <a:solidFill>
-                  <a:srgbClr val="2980B9"/>
+                  <a:srgbClr val="D5D583"/>
+                </a:solidFill>
+                <a:latin typeface="Noto Sans [monotype]" charset="0"/>
+                <a:ea typeface="Sans Serif" charset="0"/>
+              </a:rPr>
+              <a:t>if</a:t>
+            </a:r>
+            <a:r>
+              <a:rPr lang="x-none" sz="1200">
+                <a:solidFill>
+                  <a:schemeClr val="bg1"/>
+                </a:solidFill>
+                <a:latin typeface="Noto Sans [monotype]" charset="0"/>
+                <a:ea typeface="Sans Serif" charset="0"/>
+              </a:rPr>
+              <a:t> (e &gt; r)</a:t>
+            </a:r>
+            <a:r>
+              <a:rPr lang="x-none" sz="1200">
+                <a:solidFill>
+                  <a:schemeClr val="bg1"/>
                 </a:solidFill>
                 <a:latin typeface="Noto Sans [monotype]" charset="0"/>
                 <a:ea typeface="Sans Serif" charset="0"/>
@@ -6566,7 +6721,7 @@
             </a:r>
             <a:endParaRPr lang="x-none" sz="1200">
               <a:solidFill>
-                <a:srgbClr val="2980B9"/>
+                <a:schemeClr val="bg1"/>
               </a:solidFill>
               <a:latin typeface="Noto Sans [monotype]" charset="0"/>
               <a:ea typeface="Sans Serif" charset="0"/>
@@ -6587,17 +6742,39 @@
             <a:r>
               <a:rPr lang="x-none" sz="1200">
                 <a:solidFill>
-                  <a:srgbClr val="2980B9"/>
+                  <a:schemeClr val="bg1"/>
                 </a:solidFill>
                 <a:latin typeface="Noto Sans [monotype]" charset="0"/>
                 <a:ea typeface="Sans Serif" charset="0"/>
                 <a:sym typeface="+mn-ea"/>
               </a:rPr>
-              <a:t>			new_solution = modif(tmp_solution)</a:t>
+              <a:t>			new_solution = </a:t>
+            </a:r>
+            <a:r>
+              <a:rPr lang="x-none" sz="1200">
+                <a:solidFill>
+                  <a:srgbClr val="D5D583"/>
+                </a:solidFill>
+                <a:latin typeface="Noto Sans [monotype]" charset="0"/>
+                <a:ea typeface="Sans Serif" charset="0"/>
+                <a:sym typeface="+mn-ea"/>
+              </a:rPr>
+              <a:t>modif</a:t>
+            </a:r>
+            <a:r>
+              <a:rPr lang="x-none" sz="1200">
+                <a:solidFill>
+                  <a:schemeClr val="bg1"/>
+                </a:solidFill>
+                <a:latin typeface="Noto Sans [monotype]" charset="0"/>
+                <a:ea typeface="Sans Serif" charset="0"/>
+                <a:sym typeface="+mn-ea"/>
+              </a:rPr>
+              <a:t>(tmp_solution)</a:t>
             </a:r>
             <a:endParaRPr lang="x-none" sz="1200">
               <a:solidFill>
-                <a:srgbClr val="2980B9"/>
+                <a:schemeClr val="bg1"/>
               </a:solidFill>
               <a:latin typeface="Noto Sans [monotype]" charset="0"/>
               <a:ea typeface="Sans Serif" charset="0"/>
@@ -6618,17 +6795,39 @@
             <a:r>
               <a:rPr lang="x-none" sz="1200">
                 <a:solidFill>
-                  <a:srgbClr val="2980B9"/>
+                  <a:schemeClr val="bg1"/>
                 </a:solidFill>
                 <a:latin typeface="Noto Sans [monotype]" charset="0"/>
                 <a:ea typeface="Sans Serif" charset="0"/>
                 <a:sym typeface="+mn-ea"/>
               </a:rPr>
-              <a:t>			new_result = evaluate(new_solution)</a:t>
+              <a:t>			new_result = </a:t>
+            </a:r>
+            <a:r>
+              <a:rPr lang="x-none" sz="1200">
+                <a:solidFill>
+                  <a:srgbClr val="D5D583"/>
+                </a:solidFill>
+                <a:latin typeface="Noto Sans [monotype]" charset="0"/>
+                <a:ea typeface="Sans Serif" charset="0"/>
+                <a:sym typeface="+mn-ea"/>
+              </a:rPr>
+              <a:t>evaluate</a:t>
+            </a:r>
+            <a:r>
+              <a:rPr lang="x-none" sz="1200">
+                <a:solidFill>
+                  <a:schemeClr val="bg1"/>
+                </a:solidFill>
+                <a:latin typeface="Noto Sans [monotype]" charset="0"/>
+                <a:ea typeface="Sans Serif" charset="0"/>
+                <a:sym typeface="+mn-ea"/>
+              </a:rPr>
+              <a:t>(new_solution)</a:t>
             </a:r>
             <a:endParaRPr lang="x-none" sz="1200">
               <a:solidFill>
-                <a:srgbClr val="2980B9"/>
+                <a:schemeClr val="bg1"/>
               </a:solidFill>
               <a:latin typeface="Noto Sans [monotype]" charset="0"/>
               <a:ea typeface="Sans Serif" charset="0"/>
@@ -6649,7 +6848,7 @@
             <a:r>
               <a:rPr lang="x-none" sz="1200">
                 <a:solidFill>
-                  <a:srgbClr val="2980B9"/>
+                  <a:schemeClr val="bg1"/>
                 </a:solidFill>
                 <a:latin typeface="Noto Sans [monotype]" charset="0"/>
                 <a:ea typeface="Sans Serif" charset="0"/>
@@ -6659,7 +6858,7 @@
             </a:r>
             <a:endParaRPr lang="x-none" sz="1200">
               <a:solidFill>
-                <a:srgbClr val="2980B9"/>
+                <a:schemeClr val="bg1"/>
               </a:solidFill>
               <a:latin typeface="Noto Sans [monotype]" charset="0"/>
               <a:ea typeface="Sans Serif" charset="0"/>
@@ -6680,7 +6879,7 @@
             <a:r>
               <a:rPr lang="x-none" sz="1200">
                 <a:solidFill>
-                  <a:srgbClr val="2980B9"/>
+                  <a:schemeClr val="bg1"/>
                 </a:solidFill>
                 <a:latin typeface="Noto Sans [monotype]" charset="0"/>
                 <a:ea typeface="Sans Serif" charset="0"/>
@@ -6690,7 +6889,7 @@
             </a:r>
             <a:endParaRPr lang="x-none" sz="1200">
               <a:solidFill>
-                <a:srgbClr val="2980B9"/>
+                <a:schemeClr val="bg1"/>
               </a:solidFill>
               <a:latin typeface="Noto Sans [monotype]" charset="0"/>
               <a:ea typeface="Sans Serif" charset="0"/>
@@ -6711,7 +6910,7 @@
             <a:r>
               <a:rPr lang="x-none" sz="1200">
                 <a:solidFill>
-                  <a:srgbClr val="2980B9"/>
+                  <a:srgbClr val="D5D583"/>
                 </a:solidFill>
                 <a:latin typeface="Noto Sans [monotype]" charset="0"/>
                 <a:ea typeface="Sans Serif" charset="0"/>
@@ -6720,7 +6919,7 @@
             </a:r>
             <a:endParaRPr lang="x-none" sz="1200">
               <a:solidFill>
-                <a:srgbClr val="2980B9"/>
+                <a:srgbClr val="D5D583"/>
               </a:solidFill>
               <a:latin typeface="Noto Sans [monotype]" charset="0"/>
               <a:ea typeface="Sans Serif" charset="0"/>
@@ -6739,7 +6938,7 @@
             </a:pPr>
             <a:endParaRPr lang="x-none" sz="1200">
               <a:solidFill>
-                <a:srgbClr val="2980B9"/>
+                <a:schemeClr val="bg1"/>
               </a:solidFill>
               <a:latin typeface="Noto Sans [monotype]" charset="0"/>
               <a:ea typeface="Sans Serif" charset="0"/>
@@ -6758,7 +6957,7 @@
             </a:pPr>
             <a:endParaRPr lang="x-none" sz="1200">
               <a:solidFill>
-                <a:srgbClr val="2980B9"/>
+                <a:schemeClr val="bg1"/>
               </a:solidFill>
               <a:latin typeface="Noto Sans [monotype]" charset="0"/>
               <a:ea typeface="Sans Serif" charset="0"/>
@@ -6777,7 +6976,7 @@
             </a:pPr>
             <a:endParaRPr lang="x-none" sz="1200">
               <a:solidFill>
-                <a:srgbClr val="2980B9"/>
+                <a:schemeClr val="bg1"/>
               </a:solidFill>
               <a:latin typeface="Noto Sans [monotype]" charset="0"/>
               <a:ea typeface="Sans Serif" charset="0"/>
@@ -8494,7 +8693,7 @@
                         <p:par>
                           <p:cTn id="87" fill="hold">
                             <p:stCondLst>
-                              <p:cond delay="1160"/>
+                              <p:cond delay="1200"/>
                             </p:stCondLst>
                             <p:childTnLst>
                               <p:par>
@@ -8617,7 +8816,7 @@
                         <p:par>
                           <p:cTn id="93" fill="hold">
                             <p:stCondLst>
-                              <p:cond delay="2360"/>
+                              <p:cond delay="2400"/>
                             </p:stCondLst>
                             <p:childTnLst>
                               <p:par>
@@ -9118,7 +9317,7 @@
                         <p:par>
                           <p:cTn id="118" fill="hold">
                             <p:stCondLst>
-                              <p:cond delay="2360"/>
+                              <p:cond delay="2400"/>
                             </p:stCondLst>
                             <p:childTnLst>
                               <p:par>
@@ -9373,7 +9572,7 @@
                         <p:par>
                           <p:cTn id="131" fill="hold">
                             <p:stCondLst>
-                              <p:cond delay="520"/>
+                              <p:cond delay="560"/>
                             </p:stCondLst>
                             <p:childTnLst>
                               <p:par>
@@ -9496,7 +9695,7 @@
                         <p:par>
                           <p:cTn id="137" fill="hold">
                             <p:stCondLst>
-                              <p:cond delay="2040"/>
+                              <p:cond delay="2080"/>
                             </p:stCondLst>
                             <p:childTnLst>
                               <p:par>

</xml_diff>